<commit_message>
revise tokenization, add speed comparison, final evaluation comparison TBD.
</commit_message>
<xml_diff>
--- a/graphics/bilstm_postagger.pptx
+++ b/graphics/bilstm_postagger.pptx
@@ -208,7 +208,7 @@
           <a:p>
             <a:fld id="{748FFD1C-F18E-4F6D-AC27-14C46C01C648}" type="datetimeFigureOut">
               <a:rPr lang="en-US" smtClean="0"/>
-              <a:t>11/8/2017</a:t>
+              <a:t>11/27/17</a:t>
             </a:fld>
             <a:endParaRPr lang="en-US"/>
           </a:p>
@@ -703,7 +703,7 @@
           <a:p>
             <a:fld id="{4FD3B01B-87EE-4A8D-8C4C-6D5F4395B337}" type="datetimeFigureOut">
               <a:rPr lang="en-US" smtClean="0"/>
-              <a:t>11/8/2017</a:t>
+              <a:t>11/27/17</a:t>
             </a:fld>
             <a:endParaRPr lang="en-US"/>
           </a:p>
@@ -873,7 +873,7 @@
           <a:p>
             <a:fld id="{4FD3B01B-87EE-4A8D-8C4C-6D5F4395B337}" type="datetimeFigureOut">
               <a:rPr lang="en-US" smtClean="0"/>
-              <a:t>11/8/2017</a:t>
+              <a:t>11/27/17</a:t>
             </a:fld>
             <a:endParaRPr lang="en-US"/>
           </a:p>
@@ -1053,7 +1053,7 @@
           <a:p>
             <a:fld id="{4FD3B01B-87EE-4A8D-8C4C-6D5F4395B337}" type="datetimeFigureOut">
               <a:rPr lang="en-US" smtClean="0"/>
-              <a:t>11/8/2017</a:t>
+              <a:t>11/27/17</a:t>
             </a:fld>
             <a:endParaRPr lang="en-US"/>
           </a:p>
@@ -1223,7 +1223,7 @@
           <a:p>
             <a:fld id="{4FD3B01B-87EE-4A8D-8C4C-6D5F4395B337}" type="datetimeFigureOut">
               <a:rPr lang="en-US" smtClean="0"/>
-              <a:t>11/8/2017</a:t>
+              <a:t>11/27/17</a:t>
             </a:fld>
             <a:endParaRPr lang="en-US"/>
           </a:p>
@@ -1469,7 +1469,7 @@
           <a:p>
             <a:fld id="{4FD3B01B-87EE-4A8D-8C4C-6D5F4395B337}" type="datetimeFigureOut">
               <a:rPr lang="en-US" smtClean="0"/>
-              <a:t>11/8/2017</a:t>
+              <a:t>11/27/17</a:t>
             </a:fld>
             <a:endParaRPr lang="en-US"/>
           </a:p>
@@ -1701,7 +1701,7 @@
           <a:p>
             <a:fld id="{4FD3B01B-87EE-4A8D-8C4C-6D5F4395B337}" type="datetimeFigureOut">
               <a:rPr lang="en-US" smtClean="0"/>
-              <a:t>11/8/2017</a:t>
+              <a:t>11/27/17</a:t>
             </a:fld>
             <a:endParaRPr lang="en-US"/>
           </a:p>
@@ -2068,7 +2068,7 @@
           <a:p>
             <a:fld id="{4FD3B01B-87EE-4A8D-8C4C-6D5F4395B337}" type="datetimeFigureOut">
               <a:rPr lang="en-US" smtClean="0"/>
-              <a:t>11/8/2017</a:t>
+              <a:t>11/27/17</a:t>
             </a:fld>
             <a:endParaRPr lang="en-US"/>
           </a:p>
@@ -2186,7 +2186,7 @@
           <a:p>
             <a:fld id="{4FD3B01B-87EE-4A8D-8C4C-6D5F4395B337}" type="datetimeFigureOut">
               <a:rPr lang="en-US" smtClean="0"/>
-              <a:t>11/8/2017</a:t>
+              <a:t>11/27/17</a:t>
             </a:fld>
             <a:endParaRPr lang="en-US"/>
           </a:p>
@@ -2281,7 +2281,7 @@
           <a:p>
             <a:fld id="{4FD3B01B-87EE-4A8D-8C4C-6D5F4395B337}" type="datetimeFigureOut">
               <a:rPr lang="en-US" smtClean="0"/>
-              <a:t>11/8/2017</a:t>
+              <a:t>11/27/17</a:t>
             </a:fld>
             <a:endParaRPr lang="en-US"/>
           </a:p>
@@ -2558,7 +2558,7 @@
           <a:p>
             <a:fld id="{4FD3B01B-87EE-4A8D-8C4C-6D5F4395B337}" type="datetimeFigureOut">
               <a:rPr lang="en-US" smtClean="0"/>
-              <a:t>11/8/2017</a:t>
+              <a:t>11/27/17</a:t>
             </a:fld>
             <a:endParaRPr lang="en-US"/>
           </a:p>
@@ -2811,7 +2811,7 @@
           <a:p>
             <a:fld id="{4FD3B01B-87EE-4A8D-8C4C-6D5F4395B337}" type="datetimeFigureOut">
               <a:rPr lang="en-US" smtClean="0"/>
-              <a:t>11/8/2017</a:t>
+              <a:t>11/27/17</a:t>
             </a:fld>
             <a:endParaRPr lang="en-US"/>
           </a:p>
@@ -3024,7 +3024,7 @@
           <a:p>
             <a:fld id="{4FD3B01B-87EE-4A8D-8C4C-6D5F4395B337}" type="datetimeFigureOut">
               <a:rPr lang="en-US" smtClean="0"/>
-              <a:t>11/8/2017</a:t>
+              <a:t>11/27/17</a:t>
             </a:fld>
             <a:endParaRPr lang="en-US"/>
           </a:p>
@@ -12195,6 +12195,114 @@
           </a:p>
         </p:txBody>
       </p:sp>
+      <p:sp>
+        <p:nvSpPr>
+          <p:cNvPr id="197" name="TextBox 196"/>
+          <p:cNvSpPr txBox="1"/>
+          <p:nvPr/>
+        </p:nvSpPr>
+        <p:spPr>
+          <a:xfrm>
+            <a:off x="7219896" y="5521000"/>
+            <a:ext cx="849576" cy="646331"/>
+          </a:xfrm>
+          <a:prstGeom prst="rect">
+            <a:avLst/>
+          </a:prstGeom>
+          <a:noFill/>
+        </p:spPr>
+        <p:txBody>
+          <a:bodyPr wrap="square" rtlCol="0">
+            <a:spAutoFit/>
+          </a:bodyPr>
+          <a:lstStyle/>
+          <a:p>
+            <a:r>
+              <a:rPr lang="en-US" altLang="zh-CN" smtClean="0">
+                <a:latin typeface="Times New Roman" charset="0"/>
+                <a:ea typeface="Times New Roman" charset="0"/>
+                <a:cs typeface="Times New Roman" charset="0"/>
+              </a:rPr>
+              <a:t>Char</a:t>
+            </a:r>
+            <a:r>
+              <a:rPr lang="zh-CN" altLang="en-US" dirty="0" smtClean="0">
+                <a:latin typeface="Times New Roman" charset="0"/>
+                <a:ea typeface="Times New Roman" charset="0"/>
+                <a:cs typeface="Times New Roman" charset="0"/>
+              </a:rPr>
+              <a:t> </a:t>
+            </a:r>
+            <a:r>
+              <a:rPr lang="en-US" altLang="zh-CN" dirty="0" smtClean="0">
+                <a:latin typeface="Times New Roman" charset="0"/>
+                <a:ea typeface="Times New Roman" charset="0"/>
+                <a:cs typeface="Times New Roman" charset="0"/>
+              </a:rPr>
+              <a:t>Embed.</a:t>
+            </a:r>
+            <a:endParaRPr lang="en-US" dirty="0">
+              <a:latin typeface="Times New Roman" charset="0"/>
+              <a:ea typeface="Times New Roman" charset="0"/>
+              <a:cs typeface="Times New Roman" charset="0"/>
+            </a:endParaRPr>
+          </a:p>
+        </p:txBody>
+      </p:sp>
+      <p:sp>
+        <p:nvSpPr>
+          <p:cNvPr id="198" name="TextBox 197"/>
+          <p:cNvSpPr txBox="1"/>
+          <p:nvPr/>
+        </p:nvSpPr>
+        <p:spPr>
+          <a:xfrm>
+            <a:off x="7219896" y="2689888"/>
+            <a:ext cx="849576" cy="646331"/>
+          </a:xfrm>
+          <a:prstGeom prst="rect">
+            <a:avLst/>
+          </a:prstGeom>
+          <a:noFill/>
+        </p:spPr>
+        <p:txBody>
+          <a:bodyPr wrap="square" rtlCol="0">
+            <a:spAutoFit/>
+          </a:bodyPr>
+          <a:lstStyle/>
+          <a:p>
+            <a:r>
+              <a:rPr lang="en-US" altLang="zh-CN" smtClean="0">
+                <a:latin typeface="Times New Roman" charset="0"/>
+                <a:ea typeface="Times New Roman" charset="0"/>
+                <a:cs typeface="Times New Roman" charset="0"/>
+              </a:rPr>
+              <a:t>Word</a:t>
+            </a:r>
+            <a:r>
+              <a:rPr lang="zh-CN" altLang="en-US" dirty="0" smtClean="0">
+                <a:latin typeface="Times New Roman" charset="0"/>
+                <a:ea typeface="Times New Roman" charset="0"/>
+                <a:cs typeface="Times New Roman" charset="0"/>
+              </a:rPr>
+              <a:t> </a:t>
+            </a:r>
+            <a:r>
+              <a:rPr lang="en-US" altLang="zh-CN" dirty="0" smtClean="0">
+                <a:latin typeface="Times New Roman" charset="0"/>
+                <a:ea typeface="Times New Roman" charset="0"/>
+                <a:cs typeface="Times New Roman" charset="0"/>
+              </a:rPr>
+              <a:t>Embed.</a:t>
+            </a:r>
+            <a:endParaRPr lang="en-US" dirty="0">
+              <a:latin typeface="Times New Roman" charset="0"/>
+              <a:ea typeface="Times New Roman" charset="0"/>
+              <a:cs typeface="Times New Roman" charset="0"/>
+            </a:endParaRPr>
+          </a:p>
+        </p:txBody>
+      </p:sp>
     </p:spTree>
     <p:extLst>
       <p:ext uri="{BB962C8B-B14F-4D97-AF65-F5344CB8AC3E}">

</xml_diff>